<commit_message>
changed typo in both readme and ppt
</commit_message>
<xml_diff>
--- a/Project 3_Michelle Ng.pptx
+++ b/Project 3_Michelle Ng.pptx
@@ -15,8 +15,6 @@
     <p:sldId id="261" r:id="rId9"/>
     <p:sldId id="264" r:id="rId10"/>
     <p:sldId id="265" r:id="rId11"/>
-    <p:sldId id="266" r:id="rId12"/>
-    <p:sldId id="267" r:id="rId13"/>
   </p:sldIdLst>
   <p:sldSz cx="9144000" cy="6858000" type="screen4x3"/>
   <p:notesSz cx="6858000" cy="9144000"/>
@@ -3208,7 +3206,11 @@
           <a:bodyPr/>
           <a:lstStyle/>
           <a:p>
-            <a:endParaRPr lang="en-US"/>
+            <a:r>
+              <a:rPr lang="en-US" dirty="0" smtClean="0"/>
+              <a:t>Result and Conclusion</a:t>
+            </a:r>
+            <a:endParaRPr lang="en-US" dirty="0"/>
           </a:p>
         </p:txBody>
       </p:sp>
@@ -3230,151 +3232,122 @@
               </a:ext>
             </a:extLst>
           </a:blip>
-          <a:srcRect l="309" r="-1" b="-110031"/>
+          <a:srcRect l="309" r="-1" b="768"/>
           <a:stretch/>
         </p:blipFill>
-        <p:spPr/>
+        <p:spPr>
+          <a:xfrm>
+            <a:off x="457200" y="1632562"/>
+            <a:ext cx="8229600" cy="2138362"/>
+          </a:xfrm>
+        </p:spPr>
       </p:pic>
+      <p:sp>
+        <p:nvSpPr>
+          <p:cNvPr id="5" name="TextBox 4"/>
+          <p:cNvSpPr txBox="1"/>
+          <p:nvPr/>
+        </p:nvSpPr>
+        <p:spPr>
+          <a:xfrm>
+            <a:off x="457200" y="4073769"/>
+            <a:ext cx="6930102" cy="2031325"/>
+          </a:xfrm>
+          <a:prstGeom prst="rect">
+            <a:avLst/>
+          </a:prstGeom>
+          <a:noFill/>
+        </p:spPr>
+        <p:txBody>
+          <a:bodyPr wrap="none" rtlCol="0">
+            <a:spAutoFit/>
+          </a:bodyPr>
+          <a:lstStyle/>
+          <a:p>
+            <a:pPr marL="285750" indent="-285750">
+              <a:buFontTx/>
+              <a:buChar char="-"/>
+            </a:pPr>
+            <a:r>
+              <a:rPr lang="en-US" dirty="0" smtClean="0"/>
+              <a:t>Logistic Regression seems to be less accurate</a:t>
+            </a:r>
+          </a:p>
+          <a:p>
+            <a:pPr marL="285750" indent="-285750">
+              <a:buFontTx/>
+              <a:buChar char="-"/>
+            </a:pPr>
+            <a:r>
+              <a:rPr lang="en-US" dirty="0" smtClean="0"/>
+              <a:t>Models with TF-IDF </a:t>
+            </a:r>
+            <a:r>
+              <a:rPr lang="en-US" dirty="0" err="1" smtClean="0"/>
+              <a:t>Vectorizer</a:t>
+            </a:r>
+            <a:r>
+              <a:rPr lang="en-US" dirty="0" smtClean="0"/>
+              <a:t> tend to have less wrong classifications</a:t>
+            </a:r>
+          </a:p>
+          <a:p>
+            <a:pPr marL="285750" indent="-285750">
+              <a:buFontTx/>
+              <a:buChar char="-"/>
+            </a:pPr>
+            <a:endParaRPr lang="en-US" dirty="0" smtClean="0"/>
+          </a:p>
+          <a:p>
+            <a:r>
+              <a:rPr lang="en-US" dirty="0" smtClean="0"/>
+              <a:t>If it </a:t>
+            </a:r>
+            <a:r>
+              <a:rPr lang="en-US" dirty="0"/>
+              <a:t>is </a:t>
+            </a:r>
+            <a:r>
+              <a:rPr lang="en-US" dirty="0" smtClean="0"/>
+              <a:t>possible, we can </a:t>
+            </a:r>
+            <a:r>
+              <a:rPr lang="en-US" dirty="0"/>
+              <a:t>explore the following courses of action:</a:t>
+            </a:r>
+          </a:p>
+          <a:p>
+            <a:r>
+              <a:rPr lang="en-US" dirty="0"/>
+              <a:t>- introducing </a:t>
+            </a:r>
+            <a:r>
+              <a:rPr lang="en-US" dirty="0" err="1"/>
+              <a:t>regularisation</a:t>
+            </a:r>
+            <a:r>
+              <a:rPr lang="en-US" dirty="0"/>
+              <a:t> to the logistic regression model</a:t>
+            </a:r>
+          </a:p>
+          <a:p>
+            <a:r>
+              <a:rPr lang="en-US" dirty="0"/>
+              <a:t>- try decision trees instead</a:t>
+            </a:r>
+          </a:p>
+          <a:p>
+            <a:r>
+              <a:rPr lang="en-US" dirty="0"/>
+              <a:t>- develop tool further to decide on danger level of poster. </a:t>
+            </a:r>
+          </a:p>
+        </p:txBody>
+      </p:sp>
     </p:spTree>
     <p:extLst>
       <p:ext uri="{BB962C8B-B14F-4D97-AF65-F5344CB8AC3E}">
         <p14:creationId xmlns:p14="http://schemas.microsoft.com/office/powerpoint/2010/main" val="1336207443"/>
-      </p:ext>
-    </p:extLst>
-  </p:cSld>
-  <p:clrMapOvr>
-    <a:masterClrMapping/>
-  </p:clrMapOvr>
-</p:sld>
-</file>
-
-<file path=ppt/slides/slide11.xml><?xml version="1.0" encoding="utf-8"?>
-<p:sld xmlns:a="http://schemas.openxmlformats.org/drawingml/2006/main" xmlns:r="http://schemas.openxmlformats.org/officeDocument/2006/relationships" xmlns:p="http://schemas.openxmlformats.org/presentationml/2006/main">
-  <p:cSld>
-    <p:spTree>
-      <p:nvGrpSpPr>
-        <p:cNvPr id="1" name=""/>
-        <p:cNvGrpSpPr/>
-        <p:nvPr/>
-      </p:nvGrpSpPr>
-      <p:grpSpPr>
-        <a:xfrm>
-          <a:off x="0" y="0"/>
-          <a:ext cx="0" cy="0"/>
-          <a:chOff x="0" y="0"/>
-          <a:chExt cx="0" cy="0"/>
-        </a:xfrm>
-      </p:grpSpPr>
-      <p:sp>
-        <p:nvSpPr>
-          <p:cNvPr id="2" name="Title 1"/>
-          <p:cNvSpPr>
-            <a:spLocks noGrp="1"/>
-          </p:cNvSpPr>
-          <p:nvPr>
-            <p:ph type="title"/>
-          </p:nvPr>
-        </p:nvSpPr>
-        <p:spPr/>
-        <p:txBody>
-          <a:bodyPr/>
-          <a:lstStyle/>
-          <a:p>
-            <a:endParaRPr lang="en-US"/>
-          </a:p>
-        </p:txBody>
-      </p:sp>
-      <p:sp>
-        <p:nvSpPr>
-          <p:cNvPr id="3" name="Content Placeholder 2"/>
-          <p:cNvSpPr>
-            <a:spLocks noGrp="1"/>
-          </p:cNvSpPr>
-          <p:nvPr>
-            <p:ph idx="1"/>
-          </p:nvPr>
-        </p:nvSpPr>
-        <p:spPr/>
-        <p:txBody>
-          <a:bodyPr/>
-          <a:lstStyle/>
-          <a:p>
-            <a:endParaRPr lang="en-US"/>
-          </a:p>
-        </p:txBody>
-      </p:sp>
-    </p:spTree>
-    <p:extLst>
-      <p:ext uri="{BB962C8B-B14F-4D97-AF65-F5344CB8AC3E}">
-        <p14:creationId xmlns:p14="http://schemas.microsoft.com/office/powerpoint/2010/main" val="1846622467"/>
-      </p:ext>
-    </p:extLst>
-  </p:cSld>
-  <p:clrMapOvr>
-    <a:masterClrMapping/>
-  </p:clrMapOvr>
-</p:sld>
-</file>
-
-<file path=ppt/slides/slide12.xml><?xml version="1.0" encoding="utf-8"?>
-<p:sld xmlns:a="http://schemas.openxmlformats.org/drawingml/2006/main" xmlns:r="http://schemas.openxmlformats.org/officeDocument/2006/relationships" xmlns:p="http://schemas.openxmlformats.org/presentationml/2006/main">
-  <p:cSld>
-    <p:spTree>
-      <p:nvGrpSpPr>
-        <p:cNvPr id="1" name=""/>
-        <p:cNvGrpSpPr/>
-        <p:nvPr/>
-      </p:nvGrpSpPr>
-      <p:grpSpPr>
-        <a:xfrm>
-          <a:off x="0" y="0"/>
-          <a:ext cx="0" cy="0"/>
-          <a:chOff x="0" y="0"/>
-          <a:chExt cx="0" cy="0"/>
-        </a:xfrm>
-      </p:grpSpPr>
-      <p:sp>
-        <p:nvSpPr>
-          <p:cNvPr id="2" name="Title 1"/>
-          <p:cNvSpPr>
-            <a:spLocks noGrp="1"/>
-          </p:cNvSpPr>
-          <p:nvPr>
-            <p:ph type="title"/>
-          </p:nvPr>
-        </p:nvSpPr>
-        <p:spPr/>
-        <p:txBody>
-          <a:bodyPr/>
-          <a:lstStyle/>
-          <a:p>
-            <a:endParaRPr lang="en-US"/>
-          </a:p>
-        </p:txBody>
-      </p:sp>
-      <p:sp>
-        <p:nvSpPr>
-          <p:cNvPr id="3" name="Content Placeholder 2"/>
-          <p:cNvSpPr>
-            <a:spLocks noGrp="1"/>
-          </p:cNvSpPr>
-          <p:nvPr>
-            <p:ph idx="1"/>
-          </p:nvPr>
-        </p:nvSpPr>
-        <p:spPr/>
-        <p:txBody>
-          <a:bodyPr/>
-          <a:lstStyle/>
-          <a:p>
-            <a:endParaRPr lang="en-US"/>
-          </a:p>
-        </p:txBody>
-      </p:sp>
-    </p:spTree>
-    <p:extLst>
-      <p:ext uri="{BB962C8B-B14F-4D97-AF65-F5344CB8AC3E}">
-        <p14:creationId xmlns:p14="http://schemas.microsoft.com/office/powerpoint/2010/main" val="3150719609"/>
       </p:ext>
     </p:extLst>
   </p:cSld>
@@ -4317,25 +4290,6 @@
           <a:chExt cx="0" cy="0"/>
         </a:xfrm>
       </p:grpSpPr>
-      <p:sp>
-        <p:nvSpPr>
-          <p:cNvPr id="2" name="Title 1"/>
-          <p:cNvSpPr>
-            <a:spLocks noGrp="1"/>
-          </p:cNvSpPr>
-          <p:nvPr>
-            <p:ph type="title"/>
-          </p:nvPr>
-        </p:nvSpPr>
-        <p:spPr/>
-        <p:txBody>
-          <a:bodyPr/>
-          <a:lstStyle/>
-          <a:p>
-            <a:endParaRPr lang="en-US"/>
-          </a:p>
-        </p:txBody>
-      </p:sp>
       <p:pic>
         <p:nvPicPr>
           <p:cNvPr id="4" name="Content Placeholder 3" descr="Screenshot 2019-10-25 at 3.12.51 AM.png"/>
@@ -4359,11 +4313,703 @@
         </p:blipFill>
         <p:spPr>
           <a:xfrm>
-            <a:off x="541095" y="561384"/>
+            <a:off x="457200" y="383875"/>
             <a:ext cx="8229600" cy="5733365"/>
           </a:xfrm>
         </p:spPr>
       </p:pic>
+      <p:sp>
+        <p:nvSpPr>
+          <p:cNvPr id="6" name="Round Same Side Corner Rectangle 5"/>
+          <p:cNvSpPr/>
+          <p:nvPr/>
+        </p:nvSpPr>
+        <p:spPr>
+          <a:xfrm>
+            <a:off x="4167074" y="3194613"/>
+            <a:ext cx="248041" cy="228186"/>
+          </a:xfrm>
+          <a:prstGeom prst="round2SameRect">
+            <a:avLst/>
+          </a:prstGeom>
+          <a:solidFill>
+            <a:srgbClr val="D9B087"/>
+          </a:solidFill>
+          <a:ln>
+            <a:noFill/>
+          </a:ln>
+        </p:spPr>
+        <p:style>
+          <a:lnRef idx="2">
+            <a:schemeClr val="dk1"/>
+          </a:lnRef>
+          <a:fillRef idx="1">
+            <a:schemeClr val="lt1"/>
+          </a:fillRef>
+          <a:effectRef idx="0">
+            <a:schemeClr val="dk1"/>
+          </a:effectRef>
+          <a:fontRef idx="minor">
+            <a:schemeClr val="dk1"/>
+          </a:fontRef>
+        </p:style>
+        <p:txBody>
+          <a:bodyPr rtlCol="0" anchor="ctr"/>
+          <a:lstStyle/>
+          <a:p>
+            <a:pPr algn="ctr"/>
+            <a:endParaRPr lang="en-US"/>
+          </a:p>
+        </p:txBody>
+      </p:sp>
+      <p:sp>
+        <p:nvSpPr>
+          <p:cNvPr id="7" name="Round Same Side Corner Rectangle 6"/>
+          <p:cNvSpPr/>
+          <p:nvPr/>
+        </p:nvSpPr>
+        <p:spPr>
+          <a:xfrm>
+            <a:off x="2037504" y="3232920"/>
+            <a:ext cx="248041" cy="228186"/>
+          </a:xfrm>
+          <a:prstGeom prst="round2SameRect">
+            <a:avLst/>
+          </a:prstGeom>
+          <a:solidFill>
+            <a:srgbClr val="FC8386"/>
+          </a:solidFill>
+          <a:ln>
+            <a:solidFill>
+              <a:srgbClr val="FD8487"/>
+            </a:solidFill>
+          </a:ln>
+        </p:spPr>
+        <p:style>
+          <a:lnRef idx="2">
+            <a:schemeClr val="dk1"/>
+          </a:lnRef>
+          <a:fillRef idx="1">
+            <a:schemeClr val="lt1"/>
+          </a:fillRef>
+          <a:effectRef idx="0">
+            <a:schemeClr val="dk1"/>
+          </a:effectRef>
+          <a:fontRef idx="minor">
+            <a:schemeClr val="dk1"/>
+          </a:fontRef>
+        </p:style>
+        <p:txBody>
+          <a:bodyPr rtlCol="0" anchor="ctr"/>
+          <a:lstStyle/>
+          <a:p>
+            <a:pPr algn="ctr"/>
+            <a:endParaRPr lang="en-US"/>
+          </a:p>
+        </p:txBody>
+      </p:sp>
+      <p:sp>
+        <p:nvSpPr>
+          <p:cNvPr id="5" name="TextBox 4"/>
+          <p:cNvSpPr txBox="1"/>
+          <p:nvPr/>
+        </p:nvSpPr>
+        <p:spPr>
+          <a:xfrm>
+            <a:off x="1420633" y="1712918"/>
+            <a:ext cx="1729823" cy="3416320"/>
+          </a:xfrm>
+          <a:prstGeom prst="rect">
+            <a:avLst/>
+          </a:prstGeom>
+          <a:noFill/>
+        </p:spPr>
+        <p:txBody>
+          <a:bodyPr wrap="none" rtlCol="0">
+            <a:spAutoFit/>
+          </a:bodyPr>
+          <a:lstStyle/>
+          <a:p>
+            <a:pPr algn="r"/>
+            <a:r>
+              <a:rPr lang="en-US" dirty="0"/>
+              <a:t>'</a:t>
+            </a:r>
+            <a:r>
+              <a:rPr lang="en-US" dirty="0" smtClean="0"/>
+              <a:t>dh’ 'mom’ </a:t>
+            </a:r>
+          </a:p>
+          <a:p>
+            <a:pPr algn="r"/>
+            <a:r>
+              <a:rPr lang="en-US" dirty="0" smtClean="0"/>
+              <a:t>'family’ 'mother’ </a:t>
+            </a:r>
+          </a:p>
+          <a:p>
+            <a:pPr algn="r"/>
+            <a:r>
+              <a:rPr lang="en-US" dirty="0" smtClean="0"/>
+              <a:t>'husband’ 'baby’</a:t>
+            </a:r>
+          </a:p>
+          <a:p>
+            <a:pPr algn="r"/>
+            <a:r>
+              <a:rPr lang="en-US" dirty="0" smtClean="0"/>
+              <a:t>'house’ 'kid’ </a:t>
+            </a:r>
+          </a:p>
+          <a:p>
+            <a:pPr algn="r"/>
+            <a:r>
+              <a:rPr lang="en-US" dirty="0" smtClean="0"/>
+              <a:t>'son’ 'child’</a:t>
+            </a:r>
+          </a:p>
+          <a:p>
+            <a:pPr algn="r"/>
+            <a:r>
+              <a:rPr lang="en-US" dirty="0" smtClean="0"/>
+              <a:t>'see’ '</a:t>
+            </a:r>
+            <a:r>
+              <a:rPr lang="en-US" dirty="0" err="1" smtClean="0"/>
+              <a:t>sil</a:t>
+            </a:r>
+            <a:r>
+              <a:rPr lang="en-US" dirty="0" smtClean="0"/>
+              <a:t>’ 'need’ </a:t>
+            </a:r>
+          </a:p>
+          <a:p>
+            <a:pPr algn="r"/>
+            <a:r>
+              <a:rPr lang="en-US" dirty="0" smtClean="0"/>
+              <a:t>'well’ 'come’</a:t>
+            </a:r>
+          </a:p>
+          <a:p>
+            <a:pPr algn="r"/>
+            <a:r>
+              <a:rPr lang="en-US" dirty="0" smtClean="0"/>
+              <a:t>'wedding’ </a:t>
+            </a:r>
+          </a:p>
+          <a:p>
+            <a:pPr algn="r"/>
+            <a:r>
+              <a:rPr lang="en-US" dirty="0" smtClean="0"/>
+              <a:t>'week’ 'tell’ </a:t>
+            </a:r>
+          </a:p>
+          <a:p>
+            <a:pPr algn="r"/>
+            <a:r>
+              <a:rPr lang="en-US" dirty="0" smtClean="0"/>
+              <a:t>'daughter’ </a:t>
+            </a:r>
+          </a:p>
+          <a:p>
+            <a:pPr algn="r"/>
+            <a:r>
+              <a:rPr lang="en-US" dirty="0" smtClean="0"/>
+              <a:t>'could’ 'home’</a:t>
+            </a:r>
+          </a:p>
+          <a:p>
+            <a:pPr algn="r"/>
+            <a:r>
+              <a:rPr lang="en-US" dirty="0" smtClean="0"/>
+              <a:t>'call’ '</a:t>
+            </a:r>
+            <a:r>
+              <a:rPr lang="en-US" dirty="0"/>
+              <a:t>parent'</a:t>
+            </a:r>
+          </a:p>
+        </p:txBody>
+      </p:sp>
+      <p:sp>
+        <p:nvSpPr>
+          <p:cNvPr id="8" name="TextBox 7"/>
+          <p:cNvSpPr txBox="1"/>
+          <p:nvPr/>
+        </p:nvSpPr>
+        <p:spPr>
+          <a:xfrm>
+            <a:off x="3150456" y="1440229"/>
+            <a:ext cx="418654" cy="369332"/>
+          </a:xfrm>
+          <a:prstGeom prst="rect">
+            <a:avLst/>
+          </a:prstGeom>
+          <a:noFill/>
+        </p:spPr>
+        <p:txBody>
+          <a:bodyPr wrap="none" rtlCol="0">
+            <a:spAutoFit/>
+          </a:bodyPr>
+          <a:lstStyle/>
+          <a:p>
+            <a:r>
+              <a:rPr lang="en-US" dirty="0" smtClean="0"/>
+              <a:t>23</a:t>
+            </a:r>
+            <a:endParaRPr lang="en-US" dirty="0"/>
+          </a:p>
+        </p:txBody>
+      </p:sp>
+      <p:sp>
+        <p:nvSpPr>
+          <p:cNvPr id="9" name="Round Same Side Corner Rectangle 8"/>
+          <p:cNvSpPr/>
+          <p:nvPr/>
+        </p:nvSpPr>
+        <p:spPr>
+          <a:xfrm>
+            <a:off x="6274031" y="3211700"/>
+            <a:ext cx="248041" cy="228186"/>
+          </a:xfrm>
+          <a:prstGeom prst="round2SameRect">
+            <a:avLst/>
+          </a:prstGeom>
+          <a:solidFill>
+            <a:srgbClr val="89C487"/>
+          </a:solidFill>
+          <a:ln>
+            <a:noFill/>
+          </a:ln>
+        </p:spPr>
+        <p:style>
+          <a:lnRef idx="2">
+            <a:schemeClr val="dk1"/>
+          </a:lnRef>
+          <a:fillRef idx="1">
+            <a:schemeClr val="lt1"/>
+          </a:fillRef>
+          <a:effectRef idx="0">
+            <a:schemeClr val="dk1"/>
+          </a:effectRef>
+          <a:fontRef idx="minor">
+            <a:schemeClr val="dk1"/>
+          </a:fontRef>
+        </p:style>
+        <p:txBody>
+          <a:bodyPr rtlCol="0" anchor="ctr"/>
+          <a:lstStyle/>
+          <a:p>
+            <a:pPr algn="ctr"/>
+            <a:endParaRPr lang="en-US"/>
+          </a:p>
+        </p:txBody>
+      </p:sp>
+      <p:sp>
+        <p:nvSpPr>
+          <p:cNvPr id="10" name="TextBox 9"/>
+          <p:cNvSpPr txBox="1"/>
+          <p:nvPr/>
+        </p:nvSpPr>
+        <p:spPr>
+          <a:xfrm>
+            <a:off x="3275382" y="2178949"/>
+            <a:ext cx="2013179" cy="2862323"/>
+          </a:xfrm>
+          <a:prstGeom prst="rect">
+            <a:avLst/>
+          </a:prstGeom>
+          <a:noFill/>
+        </p:spPr>
+        <p:txBody>
+          <a:bodyPr wrap="none" rtlCol="0">
+            <a:spAutoFit/>
+          </a:bodyPr>
+          <a:lstStyle/>
+          <a:p>
+            <a:pPr algn="ctr"/>
+            <a:r>
+              <a:rPr lang="nl-NL" dirty="0"/>
+              <a:t>'</a:t>
+            </a:r>
+            <a:r>
+              <a:rPr lang="nl-NL" dirty="0" err="1" smtClean="0"/>
+              <a:t>wa</a:t>
+            </a:r>
+            <a:r>
+              <a:rPr lang="nl-NL" dirty="0" smtClean="0"/>
+              <a:t>’ 'ha’ 'get’ 'time’</a:t>
+            </a:r>
+          </a:p>
+          <a:p>
+            <a:pPr algn="ctr"/>
+            <a:r>
+              <a:rPr lang="nl-NL" dirty="0" smtClean="0"/>
+              <a:t>'</a:t>
+            </a:r>
+            <a:r>
+              <a:rPr lang="nl-NL" dirty="0" err="1" smtClean="0"/>
+              <a:t>like</a:t>
+            </a:r>
+            <a:r>
+              <a:rPr lang="nl-NL" dirty="0" smtClean="0"/>
+              <a:t>’ '</a:t>
+            </a:r>
+            <a:r>
+              <a:rPr lang="nl-NL" dirty="0" err="1" smtClean="0"/>
+              <a:t>would</a:t>
+            </a:r>
+            <a:r>
+              <a:rPr lang="nl-NL" dirty="0" smtClean="0"/>
+              <a:t>’ 'want’ </a:t>
+            </a:r>
+          </a:p>
+          <a:p>
+            <a:pPr algn="ctr"/>
+            <a:r>
+              <a:rPr lang="nl-NL" dirty="0" smtClean="0"/>
+              <a:t>'</a:t>
+            </a:r>
+            <a:r>
+              <a:rPr lang="nl-NL" dirty="0" err="1" smtClean="0"/>
+              <a:t>know</a:t>
+            </a:r>
+            <a:r>
+              <a:rPr lang="nl-NL" dirty="0" smtClean="0"/>
+              <a:t>’ '</a:t>
+            </a:r>
+            <a:r>
+              <a:rPr lang="nl-NL" dirty="0" err="1" smtClean="0"/>
+              <a:t>said</a:t>
+            </a:r>
+            <a:r>
+              <a:rPr lang="nl-NL" dirty="0" smtClean="0"/>
+              <a:t>’ '</a:t>
+            </a:r>
+            <a:r>
+              <a:rPr lang="nl-NL" dirty="0" err="1" smtClean="0"/>
+              <a:t>told</a:t>
+            </a:r>
+            <a:r>
+              <a:rPr lang="nl-NL" dirty="0" smtClean="0"/>
+              <a:t>’ </a:t>
+            </a:r>
+          </a:p>
+          <a:p>
+            <a:pPr algn="ctr"/>
+            <a:r>
+              <a:rPr lang="nl-NL" dirty="0" smtClean="0"/>
+              <a:t>'</a:t>
+            </a:r>
+            <a:r>
+              <a:rPr lang="nl-NL" dirty="0" err="1" smtClean="0"/>
+              <a:t>going</a:t>
+            </a:r>
+            <a:r>
+              <a:rPr lang="nl-NL" dirty="0" smtClean="0"/>
+              <a:t>’ '</a:t>
+            </a:r>
+            <a:r>
+              <a:rPr lang="nl-NL" dirty="0" err="1" smtClean="0"/>
+              <a:t>one</a:t>
+            </a:r>
+            <a:r>
+              <a:rPr lang="nl-NL" dirty="0" smtClean="0"/>
+              <a:t>’ '</a:t>
+            </a:r>
+            <a:r>
+              <a:rPr lang="nl-NL" dirty="0" err="1" smtClean="0"/>
+              <a:t>year</a:t>
+            </a:r>
+            <a:r>
+              <a:rPr lang="nl-NL" dirty="0" smtClean="0"/>
+              <a:t>’ </a:t>
+            </a:r>
+          </a:p>
+          <a:p>
+            <a:pPr algn="ctr"/>
+            <a:r>
+              <a:rPr lang="nl-NL" dirty="0" smtClean="0"/>
+              <a:t>'go’ '</a:t>
+            </a:r>
+            <a:r>
+              <a:rPr lang="nl-NL" dirty="0" err="1" smtClean="0"/>
+              <a:t>thing</a:t>
+            </a:r>
+            <a:r>
+              <a:rPr lang="nl-NL" dirty="0" smtClean="0"/>
+              <a:t>’ '</a:t>
+            </a:r>
+            <a:r>
+              <a:rPr lang="nl-NL" dirty="0" err="1" smtClean="0"/>
+              <a:t>day</a:t>
+            </a:r>
+            <a:r>
+              <a:rPr lang="nl-NL" dirty="0" smtClean="0"/>
+              <a:t>’ </a:t>
+            </a:r>
+          </a:p>
+          <a:p>
+            <a:pPr algn="ctr"/>
+            <a:r>
+              <a:rPr lang="nl-NL" dirty="0" smtClean="0"/>
+              <a:t>'say’ 'even’ 'back’ </a:t>
+            </a:r>
+          </a:p>
+          <a:p>
+            <a:pPr algn="ctr"/>
+            <a:r>
+              <a:rPr lang="nl-NL" dirty="0" smtClean="0"/>
+              <a:t>'never’ ‘</a:t>
+            </a:r>
+            <a:r>
+              <a:rPr lang="nl-NL" dirty="0" err="1" smtClean="0"/>
+              <a:t>got</a:t>
+            </a:r>
+            <a:r>
+              <a:rPr lang="nl-NL" dirty="0" smtClean="0"/>
+              <a:t>’ 'make’ </a:t>
+            </a:r>
+          </a:p>
+          <a:p>
+            <a:pPr algn="ctr"/>
+            <a:r>
+              <a:rPr lang="nl-NL" dirty="0" smtClean="0"/>
+              <a:t>'</a:t>
+            </a:r>
+            <a:r>
+              <a:rPr lang="nl-NL" dirty="0" err="1" smtClean="0"/>
+              <a:t>think</a:t>
+            </a:r>
+            <a:r>
+              <a:rPr lang="nl-NL" dirty="0" smtClean="0"/>
+              <a:t>’ '</a:t>
+            </a:r>
+            <a:r>
+              <a:rPr lang="nl-NL" dirty="0" err="1" smtClean="0"/>
+              <a:t>also</a:t>
+            </a:r>
+            <a:r>
+              <a:rPr lang="nl-NL" dirty="0" smtClean="0"/>
+              <a:t>’</a:t>
+            </a:r>
+          </a:p>
+          <a:p>
+            <a:pPr algn="ctr"/>
+            <a:r>
+              <a:rPr lang="nl-NL" dirty="0" smtClean="0"/>
+              <a:t>'feel’ '</a:t>
+            </a:r>
+            <a:r>
+              <a:rPr lang="nl-NL" dirty="0" err="1" smtClean="0"/>
+              <a:t>really</a:t>
+            </a:r>
+            <a:r>
+              <a:rPr lang="nl-NL" dirty="0" smtClean="0"/>
+              <a:t>’ </a:t>
+            </a:r>
+          </a:p>
+          <a:p>
+            <a:pPr algn="ctr"/>
+            <a:r>
+              <a:rPr lang="nl-NL" dirty="0" smtClean="0"/>
+              <a:t>'</a:t>
+            </a:r>
+            <a:r>
+              <a:rPr lang="nl-NL" dirty="0" err="1"/>
+              <a:t>much</a:t>
+            </a:r>
+            <a:r>
+              <a:rPr lang="nl-NL" dirty="0"/>
+              <a:t>'</a:t>
+            </a:r>
+            <a:endParaRPr lang="en-US" dirty="0"/>
+          </a:p>
+        </p:txBody>
+      </p:sp>
+      <p:sp>
+        <p:nvSpPr>
+          <p:cNvPr id="11" name="TextBox 10"/>
+          <p:cNvSpPr txBox="1"/>
+          <p:nvPr/>
+        </p:nvSpPr>
+        <p:spPr>
+          <a:xfrm>
+            <a:off x="3973950" y="1712918"/>
+            <a:ext cx="418654" cy="369332"/>
+          </a:xfrm>
+          <a:prstGeom prst="rect">
+            <a:avLst/>
+          </a:prstGeom>
+          <a:noFill/>
+        </p:spPr>
+        <p:txBody>
+          <a:bodyPr wrap="none" rtlCol="0">
+            <a:spAutoFit/>
+          </a:bodyPr>
+          <a:lstStyle/>
+          <a:p>
+            <a:r>
+              <a:rPr lang="en-US" dirty="0" smtClean="0"/>
+              <a:t>27</a:t>
+            </a:r>
+            <a:endParaRPr lang="en-US" dirty="0"/>
+          </a:p>
+        </p:txBody>
+      </p:sp>
+      <p:sp>
+        <p:nvSpPr>
+          <p:cNvPr id="12" name="TextBox 11"/>
+          <p:cNvSpPr txBox="1"/>
+          <p:nvPr/>
+        </p:nvSpPr>
+        <p:spPr>
+          <a:xfrm>
+            <a:off x="5079234" y="1417638"/>
+            <a:ext cx="418654" cy="369332"/>
+          </a:xfrm>
+          <a:prstGeom prst="rect">
+            <a:avLst/>
+          </a:prstGeom>
+          <a:noFill/>
+        </p:spPr>
+        <p:txBody>
+          <a:bodyPr wrap="none" rtlCol="0">
+            <a:spAutoFit/>
+          </a:bodyPr>
+          <a:lstStyle/>
+          <a:p>
+            <a:r>
+              <a:rPr lang="en-US" dirty="0" smtClean="0"/>
+              <a:t>23</a:t>
+            </a:r>
+            <a:endParaRPr lang="en-US" dirty="0"/>
+          </a:p>
+        </p:txBody>
+      </p:sp>
+      <p:sp>
+        <p:nvSpPr>
+          <p:cNvPr id="13" name="TextBox 12"/>
+          <p:cNvSpPr txBox="1"/>
+          <p:nvPr/>
+        </p:nvSpPr>
+        <p:spPr>
+          <a:xfrm>
+            <a:off x="5381490" y="1728356"/>
+            <a:ext cx="1935662" cy="3416320"/>
+          </a:xfrm>
+          <a:prstGeom prst="rect">
+            <a:avLst/>
+          </a:prstGeom>
+          <a:noFill/>
+        </p:spPr>
+        <p:txBody>
+          <a:bodyPr wrap="square" rtlCol="0">
+            <a:spAutoFit/>
+          </a:bodyPr>
+          <a:lstStyle/>
+          <a:p>
+            <a:r>
+              <a:rPr lang="en-US" dirty="0"/>
+              <a:t>'</a:t>
+            </a:r>
+            <a:r>
+              <a:rPr lang="en-US" dirty="0" smtClean="0"/>
+              <a:t>friend’ ‘girl’ </a:t>
+            </a:r>
+          </a:p>
+          <a:p>
+            <a:r>
+              <a:rPr lang="en-US" dirty="0" smtClean="0"/>
+              <a:t>‘love’ ‘together’ </a:t>
+            </a:r>
+          </a:p>
+          <a:p>
+            <a:r>
+              <a:rPr lang="en-US" dirty="0" smtClean="0"/>
+              <a:t>'month’</a:t>
+            </a:r>
+            <a:r>
+              <a:rPr lang="mr-IN" dirty="0" smtClean="0"/>
+              <a:t> </a:t>
+            </a:r>
+            <a:r>
+              <a:rPr lang="en-US" dirty="0" smtClean="0"/>
+              <a:t>‘guy’ </a:t>
+            </a:r>
+          </a:p>
+          <a:p>
+            <a:r>
+              <a:rPr lang="en-US" dirty="0" smtClean="0"/>
+              <a:t>‘boyfriend’ ‘sex’ </a:t>
+            </a:r>
+          </a:p>
+          <a:p>
+            <a:r>
+              <a:rPr lang="en-US" dirty="0" smtClean="0"/>
+              <a:t>‘work’ ‘still’ ‘feel’</a:t>
+            </a:r>
+          </a:p>
+          <a:p>
+            <a:r>
+              <a:rPr lang="en-US" dirty="0" smtClean="0"/>
+              <a:t> ‘like’ ‘feeling’</a:t>
+            </a:r>
+          </a:p>
+          <a:p>
+            <a:r>
+              <a:rPr lang="mr-IN" dirty="0" smtClean="0"/>
+              <a:t> </a:t>
+            </a:r>
+            <a:r>
+              <a:rPr lang="en-US" dirty="0" smtClean="0"/>
+              <a:t>‘always’ ‘started’</a:t>
+            </a:r>
+          </a:p>
+          <a:p>
+            <a:r>
+              <a:rPr lang="en-US" dirty="0" smtClean="0"/>
+              <a:t>‘talk’ ‘girlfriend’ </a:t>
+            </a:r>
+          </a:p>
+          <a:p>
+            <a:r>
+              <a:rPr lang="en-US" dirty="0" smtClean="0"/>
+              <a:t>‘way’ ‘since’ </a:t>
+            </a:r>
+          </a:p>
+          <a:p>
+            <a:r>
+              <a:rPr lang="en-US" dirty="0" smtClean="0"/>
+              <a:t>‘lot’ ‘help’ </a:t>
+            </a:r>
+          </a:p>
+          <a:p>
+            <a:r>
+              <a:rPr lang="en-US" dirty="0" smtClean="0"/>
+              <a:t>‘something’ </a:t>
+            </a:r>
+          </a:p>
+          <a:p>
+            <a:r>
+              <a:rPr lang="en-US" dirty="0" smtClean="0"/>
+              <a:t>‘dating</a:t>
+            </a:r>
+            <a:r>
+              <a:rPr lang="mr-IN" dirty="0" smtClean="0"/>
+              <a:t>’</a:t>
+            </a:r>
+            <a:r>
+              <a:rPr lang="en-US" dirty="0" smtClean="0"/>
+              <a:t> ‘life</a:t>
+            </a:r>
+            <a:r>
+              <a:rPr lang="en-US" dirty="0"/>
+              <a:t>'</a:t>
+            </a:r>
+          </a:p>
+        </p:txBody>
+      </p:sp>
     </p:spTree>
     <p:extLst>
       <p:ext uri="{BB962C8B-B14F-4D97-AF65-F5344CB8AC3E}">

</xml_diff>